<commit_message>
Update IRIS landscape diagram with six-legged instead of eight-legged larva
</commit_message>
<xml_diff>
--- a/documents/odd/figures/IRIS_landscape.pptx
+++ b/documents/odd/figures/IRIS_landscape.pptx
@@ -5,7 +5,7 @@
     <p:sldMasterId id="2147483648" r:id="rId1"/>
   </p:sldMasterIdLst>
   <p:sldIdLst>
-    <p:sldId id="259" r:id="rId2"/>
+    <p:sldId id="260" r:id="rId2"/>
   </p:sldIdLst>
   <p:sldSz cx="12192000" cy="6858000"/>
   <p:notesSz cx="6858000" cy="9144000"/>
@@ -243,7 +243,7 @@
           <a:p>
             <a:fld id="{32496A64-BE39-45EA-A2CE-2789F47AA9EF}" type="datetimeFigureOut">
               <a:rPr lang="de-DE" smtClean="0"/>
-              <a:t>26.04.2021</a:t>
+              <a:t>04.11.2021</a:t>
             </a:fld>
             <a:endParaRPr lang="de-DE"/>
           </a:p>
@@ -413,7 +413,7 @@
           <a:p>
             <a:fld id="{32496A64-BE39-45EA-A2CE-2789F47AA9EF}" type="datetimeFigureOut">
               <a:rPr lang="de-DE" smtClean="0"/>
-              <a:t>26.04.2021</a:t>
+              <a:t>04.11.2021</a:t>
             </a:fld>
             <a:endParaRPr lang="de-DE"/>
           </a:p>
@@ -593,7 +593,7 @@
           <a:p>
             <a:fld id="{32496A64-BE39-45EA-A2CE-2789F47AA9EF}" type="datetimeFigureOut">
               <a:rPr lang="de-DE" smtClean="0"/>
-              <a:t>26.04.2021</a:t>
+              <a:t>04.11.2021</a:t>
             </a:fld>
             <a:endParaRPr lang="de-DE"/>
           </a:p>
@@ -763,7 +763,7 @@
           <a:p>
             <a:fld id="{32496A64-BE39-45EA-A2CE-2789F47AA9EF}" type="datetimeFigureOut">
               <a:rPr lang="de-DE" smtClean="0"/>
-              <a:t>26.04.2021</a:t>
+              <a:t>04.11.2021</a:t>
             </a:fld>
             <a:endParaRPr lang="de-DE"/>
           </a:p>
@@ -1009,7 +1009,7 @@
           <a:p>
             <a:fld id="{32496A64-BE39-45EA-A2CE-2789F47AA9EF}" type="datetimeFigureOut">
               <a:rPr lang="de-DE" smtClean="0"/>
-              <a:t>26.04.2021</a:t>
+              <a:t>04.11.2021</a:t>
             </a:fld>
             <a:endParaRPr lang="de-DE"/>
           </a:p>
@@ -1241,7 +1241,7 @@
           <a:p>
             <a:fld id="{32496A64-BE39-45EA-A2CE-2789F47AA9EF}" type="datetimeFigureOut">
               <a:rPr lang="de-DE" smtClean="0"/>
-              <a:t>26.04.2021</a:t>
+              <a:t>04.11.2021</a:t>
             </a:fld>
             <a:endParaRPr lang="de-DE"/>
           </a:p>
@@ -1608,7 +1608,7 @@
           <a:p>
             <a:fld id="{32496A64-BE39-45EA-A2CE-2789F47AA9EF}" type="datetimeFigureOut">
               <a:rPr lang="de-DE" smtClean="0"/>
-              <a:t>26.04.2021</a:t>
+              <a:t>04.11.2021</a:t>
             </a:fld>
             <a:endParaRPr lang="de-DE"/>
           </a:p>
@@ -1726,7 +1726,7 @@
           <a:p>
             <a:fld id="{32496A64-BE39-45EA-A2CE-2789F47AA9EF}" type="datetimeFigureOut">
               <a:rPr lang="de-DE" smtClean="0"/>
-              <a:t>26.04.2021</a:t>
+              <a:t>04.11.2021</a:t>
             </a:fld>
             <a:endParaRPr lang="de-DE"/>
           </a:p>
@@ -1821,7 +1821,7 @@
           <a:p>
             <a:fld id="{32496A64-BE39-45EA-A2CE-2789F47AA9EF}" type="datetimeFigureOut">
               <a:rPr lang="de-DE" smtClean="0"/>
-              <a:t>26.04.2021</a:t>
+              <a:t>04.11.2021</a:t>
             </a:fld>
             <a:endParaRPr lang="de-DE"/>
           </a:p>
@@ -2098,7 +2098,7 @@
           <a:p>
             <a:fld id="{32496A64-BE39-45EA-A2CE-2789F47AA9EF}" type="datetimeFigureOut">
               <a:rPr lang="de-DE" smtClean="0"/>
-              <a:t>26.04.2021</a:t>
+              <a:t>04.11.2021</a:t>
             </a:fld>
             <a:endParaRPr lang="de-DE"/>
           </a:p>
@@ -2351,7 +2351,7 @@
           <a:p>
             <a:fld id="{32496A64-BE39-45EA-A2CE-2789F47AA9EF}" type="datetimeFigureOut">
               <a:rPr lang="de-DE" smtClean="0"/>
-              <a:t>26.04.2021</a:t>
+              <a:t>04.11.2021</a:t>
             </a:fld>
             <a:endParaRPr lang="de-DE"/>
           </a:p>
@@ -2564,7 +2564,7 @@
           <a:p>
             <a:fld id="{32496A64-BE39-45EA-A2CE-2789F47AA9EF}" type="datetimeFigureOut">
               <a:rPr lang="de-DE" smtClean="0"/>
-              <a:t>26.04.2021</a:t>
+              <a:t>04.11.2021</a:t>
             </a:fld>
             <a:endParaRPr lang="de-DE"/>
           </a:p>
@@ -3023,7 +3023,7 @@
         </p:nvSpPr>
         <p:spPr>
           <a:xfrm>
-            <a:off x="3971106" y="1118220"/>
+            <a:off x="3980631" y="1118220"/>
             <a:ext cx="1442193" cy="4307362"/>
           </a:xfrm>
           <a:prstGeom prst="rect">
@@ -3121,8 +3121,8 @@
         </p:nvSpPr>
         <p:spPr>
           <a:xfrm>
-            <a:off x="5416714" y="1114710"/>
-            <a:ext cx="721697" cy="4307362"/>
+            <a:off x="5426239" y="1118174"/>
+            <a:ext cx="721697" cy="4303897"/>
           </a:xfrm>
           <a:prstGeom prst="rect">
             <a:avLst/>
@@ -3170,8 +3170,8 @@
         </p:nvSpPr>
         <p:spPr>
           <a:xfrm>
-            <a:off x="6121636" y="1114723"/>
-            <a:ext cx="721697" cy="4307362"/>
+            <a:off x="6131161" y="1123949"/>
+            <a:ext cx="721697" cy="4298136"/>
           </a:xfrm>
           <a:prstGeom prst="rect">
             <a:avLst/>
@@ -3266,7 +3266,7 @@
         </p:nvSpPr>
         <p:spPr>
           <a:xfrm>
-            <a:off x="2531927" y="1110682"/>
+            <a:off x="2522402" y="1110682"/>
             <a:ext cx="360000" cy="4320000"/>
           </a:xfrm>
           <a:prstGeom prst="rect">
@@ -3458,8 +3458,8 @@
         </p:nvSpPr>
         <p:spPr>
           <a:xfrm>
-            <a:off x="3976056" y="1112147"/>
-            <a:ext cx="360000" cy="4322930"/>
+            <a:off x="3976056" y="1116058"/>
+            <a:ext cx="360000" cy="4309493"/>
           </a:xfrm>
           <a:prstGeom prst="rect">
             <a:avLst/>
@@ -3506,8 +3506,8 @@
         </p:nvSpPr>
         <p:spPr>
           <a:xfrm>
-            <a:off x="4334970" y="1103750"/>
-            <a:ext cx="360000" cy="4322930"/>
+            <a:off x="4334970" y="1114425"/>
+            <a:ext cx="360000" cy="4317632"/>
           </a:xfrm>
           <a:prstGeom prst="rect">
             <a:avLst/>
@@ -3602,8 +3602,8 @@
         </p:nvSpPr>
         <p:spPr>
           <a:xfrm>
-            <a:off x="5415501" y="1112147"/>
-            <a:ext cx="360000" cy="4322930"/>
+            <a:off x="5405976" y="1123948"/>
+            <a:ext cx="360000" cy="4301603"/>
           </a:xfrm>
           <a:prstGeom prst="rect">
             <a:avLst/>
@@ -3650,7 +3650,7 @@
         </p:nvSpPr>
         <p:spPr>
           <a:xfrm>
-            <a:off x="5770126" y="1110682"/>
+            <a:off x="5760601" y="1110682"/>
             <a:ext cx="360000" cy="4322930"/>
           </a:xfrm>
           <a:prstGeom prst="rect">
@@ -3698,8 +3698,8 @@
         </p:nvSpPr>
         <p:spPr>
           <a:xfrm>
-            <a:off x="6136048" y="1103750"/>
-            <a:ext cx="360000" cy="4322930"/>
+            <a:off x="6136048" y="1110682"/>
+            <a:ext cx="360000" cy="4315998"/>
           </a:xfrm>
           <a:prstGeom prst="rect">
             <a:avLst/>
@@ -3746,8 +3746,8 @@
         </p:nvSpPr>
         <p:spPr>
           <a:xfrm>
-            <a:off x="6493300" y="1112147"/>
-            <a:ext cx="360000" cy="4322930"/>
+            <a:off x="6493300" y="1114424"/>
+            <a:ext cx="360000" cy="4311127"/>
           </a:xfrm>
           <a:prstGeom prst="rect">
             <a:avLst/>
@@ -3842,7 +3842,7 @@
         </p:nvSpPr>
         <p:spPr>
           <a:xfrm rot="16200000">
-            <a:off x="4508174" y="-154439"/>
+            <a:off x="4517699" y="-163964"/>
             <a:ext cx="360000" cy="4322930"/>
           </a:xfrm>
           <a:prstGeom prst="rect">
@@ -3938,7 +3938,7 @@
         </p:nvSpPr>
         <p:spPr>
           <a:xfrm rot="16200000">
-            <a:off x="4508174" y="928349"/>
+            <a:off x="4517699" y="928349"/>
             <a:ext cx="360000" cy="4322930"/>
           </a:xfrm>
           <a:prstGeom prst="rect">
@@ -4082,7 +4082,7 @@
         </p:nvSpPr>
         <p:spPr>
           <a:xfrm rot="16200000">
-            <a:off x="4513882" y="2004608"/>
+            <a:off x="4513882" y="2014133"/>
             <a:ext cx="360000" cy="4322930"/>
           </a:xfrm>
           <a:prstGeom prst="rect">
@@ -4130,7 +4130,7 @@
         </p:nvSpPr>
         <p:spPr>
           <a:xfrm rot="16200000">
-            <a:off x="4511021" y="2366527"/>
+            <a:off x="4511021" y="2376052"/>
             <a:ext cx="360000" cy="4322930"/>
           </a:xfrm>
           <a:prstGeom prst="rect">
@@ -4178,7 +4178,7 @@
         </p:nvSpPr>
         <p:spPr>
           <a:xfrm rot="16200000">
-            <a:off x="4511021" y="2727044"/>
+            <a:off x="4511021" y="2736569"/>
             <a:ext cx="360000" cy="4322930"/>
           </a:xfrm>
           <a:prstGeom prst="rect">
@@ -4274,7 +4274,7 @@
         </p:nvSpPr>
         <p:spPr>
           <a:xfrm rot="16200000">
-            <a:off x="4512913" y="209254"/>
+            <a:off x="4512913" y="199729"/>
             <a:ext cx="360000" cy="4322930"/>
           </a:xfrm>
           <a:prstGeom prst="rect">
@@ -4360,79 +4360,9 @@
           </a:p>
         </p:txBody>
       </p:sp>
-      <p:cxnSp>
-        <p:nvCxnSpPr>
-          <p:cNvPr id="28" name="Gerader Verbinder 27"/>
-          <p:cNvCxnSpPr/>
-          <p:nvPr/>
-        </p:nvCxnSpPr>
-        <p:spPr>
-          <a:xfrm flipH="1">
-            <a:off x="5944025" y="1109784"/>
-            <a:ext cx="1615280" cy="1787284"/>
-          </a:xfrm>
-          <a:prstGeom prst="line">
-            <a:avLst/>
-          </a:prstGeom>
-          <a:ln w="15875">
-            <a:solidFill>
-              <a:schemeClr val="tx1"/>
-            </a:solidFill>
-          </a:ln>
-        </p:spPr>
-        <p:style>
-          <a:lnRef idx="1">
-            <a:schemeClr val="accent1"/>
-          </a:lnRef>
-          <a:fillRef idx="0">
-            <a:schemeClr val="accent1"/>
-          </a:fillRef>
-          <a:effectRef idx="0">
-            <a:schemeClr val="accent1"/>
-          </a:effectRef>
-          <a:fontRef idx="minor">
-            <a:schemeClr val="tx1"/>
-          </a:fontRef>
-        </p:style>
-      </p:cxnSp>
-      <p:cxnSp>
-        <p:nvCxnSpPr>
-          <p:cNvPr id="78" name="Gerader Verbinder 77"/>
-          <p:cNvCxnSpPr/>
-          <p:nvPr/>
-        </p:nvCxnSpPr>
-        <p:spPr>
-          <a:xfrm flipH="1" flipV="1">
-            <a:off x="5945367" y="3278385"/>
-            <a:ext cx="1613936" cy="704953"/>
-          </a:xfrm>
-          <a:prstGeom prst="line">
-            <a:avLst/>
-          </a:prstGeom>
-          <a:ln w="15875">
-            <a:solidFill>
-              <a:schemeClr val="tx1"/>
-            </a:solidFill>
-          </a:ln>
-        </p:spPr>
-        <p:style>
-          <a:lnRef idx="1">
-            <a:schemeClr val="accent1"/>
-          </a:lnRef>
-          <a:fillRef idx="0">
-            <a:schemeClr val="accent1"/>
-          </a:fillRef>
-          <a:effectRef idx="0">
-            <a:schemeClr val="accent1"/>
-          </a:effectRef>
-          <a:fontRef idx="minor">
-            <a:schemeClr val="tx1"/>
-          </a:fontRef>
-        </p:style>
-      </p:cxnSp>
       <p:pic>
         <p:nvPicPr>
-          <p:cNvPr id="79" name="Grafik 78"/>
+          <p:cNvPr id="87" name="Grafik 86"/>
           <p:cNvPicPr>
             <a:picLocks noChangeAspect="1"/>
           </p:cNvPicPr>
@@ -4462,8 +4392,8 @@
         </p:blipFill>
         <p:spPr>
           <a:xfrm>
-            <a:off x="7866241" y="1677578"/>
-            <a:ext cx="389671" cy="338658"/>
+            <a:off x="8626559" y="1549878"/>
+            <a:ext cx="572515" cy="497565"/>
           </a:xfrm>
           <a:prstGeom prst="rect">
             <a:avLst/>
@@ -4472,7 +4402,7 @@
       </p:pic>
       <p:pic>
         <p:nvPicPr>
-          <p:cNvPr id="87" name="Grafik 86"/>
+          <p:cNvPr id="88" name="Grafik 87"/>
           <p:cNvPicPr>
             <a:picLocks noChangeAspect="1"/>
           </p:cNvPicPr>
@@ -4502,46 +4432,6 @@
         </p:blipFill>
         <p:spPr>
           <a:xfrm>
-            <a:off x="8626559" y="1549878"/>
-            <a:ext cx="572515" cy="497565"/>
-          </a:xfrm>
-          <a:prstGeom prst="rect">
-            <a:avLst/>
-          </a:prstGeom>
-        </p:spPr>
-      </p:pic>
-      <p:pic>
-        <p:nvPicPr>
-          <p:cNvPr id="88" name="Grafik 87"/>
-          <p:cNvPicPr>
-            <a:picLocks noChangeAspect="1"/>
-          </p:cNvPicPr>
-          <p:nvPr/>
-        </p:nvPicPr>
-        <p:blipFill>
-          <a:blip r:embed="rId4" cstate="print">
-            <a:clrChange>
-              <a:clrFrom>
-                <a:srgbClr val="FFFFFF"/>
-              </a:clrFrom>
-              <a:clrTo>
-                <a:srgbClr val="FFFFFF">
-                  <a:alpha val="0"/>
-                </a:srgbClr>
-              </a:clrTo>
-            </a:clrChange>
-            <a:extLst>
-              <a:ext uri="{28A0092B-C50C-407E-A947-70E740481C1C}">
-                <a14:useLocalDpi xmlns:a14="http://schemas.microsoft.com/office/drawing/2010/main" val="0"/>
-              </a:ext>
-            </a:extLst>
-          </a:blip>
-          <a:stretch>
-            <a:fillRect/>
-          </a:stretch>
-        </p:blipFill>
-        <p:spPr>
-          <a:xfrm>
             <a:off x="9457804" y="1358270"/>
             <a:ext cx="803978" cy="698726"/>
           </a:xfrm>
@@ -4731,52 +4621,6 @@
               <a:t>Life cycle stage:</a:t>
             </a:r>
             <a:endParaRPr lang="en-GB" sz="1400" b="1" dirty="0"/>
-          </a:p>
-        </p:txBody>
-      </p:sp>
-      <p:sp>
-        <p:nvSpPr>
-          <p:cNvPr id="95" name="Rechteck 94"/>
-          <p:cNvSpPr/>
-          <p:nvPr/>
-        </p:nvSpPr>
-        <p:spPr>
-          <a:xfrm>
-            <a:off x="5768931" y="2907077"/>
-            <a:ext cx="352872" cy="355543"/>
-          </a:xfrm>
-          <a:prstGeom prst="rect">
-            <a:avLst/>
-          </a:prstGeom>
-          <a:noFill/>
-          <a:ln w="31750">
-            <a:solidFill>
-              <a:schemeClr val="tx1"/>
-            </a:solidFill>
-          </a:ln>
-        </p:spPr>
-        <p:style>
-          <a:lnRef idx="2">
-            <a:schemeClr val="accent1">
-              <a:shade val="50000"/>
-            </a:schemeClr>
-          </a:lnRef>
-          <a:fillRef idx="1">
-            <a:schemeClr val="accent1"/>
-          </a:fillRef>
-          <a:effectRef idx="0">
-            <a:schemeClr val="accent1"/>
-          </a:effectRef>
-          <a:fontRef idx="minor">
-            <a:schemeClr val="lt1"/>
-          </a:fontRef>
-        </p:style>
-        <p:txBody>
-          <a:bodyPr rtlCol="0" anchor="ctr"/>
-          <a:lstStyle/>
-          <a:p>
-            <a:pPr algn="ctr"/>
-            <a:endParaRPr lang="de-DE"/>
           </a:p>
         </p:txBody>
       </p:sp>
@@ -5279,10 +5123,158 @@
           </a:p>
         </p:txBody>
       </p:sp>
+      <p:pic>
+        <p:nvPicPr>
+          <p:cNvPr id="81" name="Grafik 80"/>
+          <p:cNvPicPr>
+            <a:picLocks noChangeAspect="1"/>
+          </p:cNvPicPr>
+          <p:nvPr/>
+        </p:nvPicPr>
+        <p:blipFill>
+          <a:blip r:embed="rId4" cstate="print">
+            <a:extLst>
+              <a:ext uri="{28A0092B-C50C-407E-A947-70E740481C1C}">
+                <a14:useLocalDpi xmlns:a14="http://schemas.microsoft.com/office/drawing/2010/main" val="0"/>
+              </a:ext>
+            </a:extLst>
+          </a:blip>
+          <a:stretch>
+            <a:fillRect/>
+          </a:stretch>
+        </p:blipFill>
+        <p:spPr>
+          <a:xfrm>
+            <a:off x="7901958" y="1645807"/>
+            <a:ext cx="473549" cy="423434"/>
+          </a:xfrm>
+          <a:prstGeom prst="rect">
+            <a:avLst/>
+          </a:prstGeom>
+        </p:spPr>
+      </p:pic>
+      <p:cxnSp>
+        <p:nvCxnSpPr>
+          <p:cNvPr id="79" name="Gerader Verbinder 78"/>
+          <p:cNvCxnSpPr>
+            <a:endCxn id="83" idx="0"/>
+          </p:cNvCxnSpPr>
+          <p:nvPr/>
+        </p:nvCxnSpPr>
+        <p:spPr>
+          <a:xfrm flipH="1">
+            <a:off x="4882558" y="1109784"/>
+            <a:ext cx="2676748" cy="1798021"/>
+          </a:xfrm>
+          <a:prstGeom prst="line">
+            <a:avLst/>
+          </a:prstGeom>
+          <a:ln w="15875">
+            <a:solidFill>
+              <a:schemeClr val="tx1"/>
+            </a:solidFill>
+          </a:ln>
+        </p:spPr>
+        <p:style>
+          <a:lnRef idx="1">
+            <a:schemeClr val="accent1"/>
+          </a:lnRef>
+          <a:fillRef idx="0">
+            <a:schemeClr val="accent1"/>
+          </a:fillRef>
+          <a:effectRef idx="0">
+            <a:schemeClr val="accent1"/>
+          </a:effectRef>
+          <a:fontRef idx="minor">
+            <a:schemeClr val="tx1"/>
+          </a:fontRef>
+        </p:style>
+      </p:cxnSp>
+      <p:cxnSp>
+        <p:nvCxnSpPr>
+          <p:cNvPr id="82" name="Gerader Verbinder 81"/>
+          <p:cNvCxnSpPr/>
+          <p:nvPr/>
+        </p:nvCxnSpPr>
+        <p:spPr>
+          <a:xfrm flipH="1" flipV="1">
+            <a:off x="4882558" y="3280184"/>
+            <a:ext cx="2676745" cy="703155"/>
+          </a:xfrm>
+          <a:prstGeom prst="line">
+            <a:avLst/>
+          </a:prstGeom>
+          <a:ln w="15875">
+            <a:solidFill>
+              <a:schemeClr val="tx1"/>
+            </a:solidFill>
+          </a:ln>
+        </p:spPr>
+        <p:style>
+          <a:lnRef idx="1">
+            <a:schemeClr val="accent1"/>
+          </a:lnRef>
+          <a:fillRef idx="0">
+            <a:schemeClr val="accent1"/>
+          </a:fillRef>
+          <a:effectRef idx="0">
+            <a:schemeClr val="accent1"/>
+          </a:effectRef>
+          <a:fontRef idx="minor">
+            <a:schemeClr val="tx1"/>
+          </a:fontRef>
+        </p:style>
+      </p:cxnSp>
+      <p:sp>
+        <p:nvSpPr>
+          <p:cNvPr id="83" name="Rechteck 82"/>
+          <p:cNvSpPr/>
+          <p:nvPr/>
+        </p:nvSpPr>
+        <p:spPr>
+          <a:xfrm>
+            <a:off x="4706122" y="2907805"/>
+            <a:ext cx="352872" cy="355543"/>
+          </a:xfrm>
+          <a:prstGeom prst="rect">
+            <a:avLst/>
+          </a:prstGeom>
+          <a:noFill/>
+          <a:ln w="31750">
+            <a:solidFill>
+              <a:schemeClr val="tx1"/>
+            </a:solidFill>
+          </a:ln>
+        </p:spPr>
+        <p:style>
+          <a:lnRef idx="2">
+            <a:schemeClr val="accent1">
+              <a:shade val="50000"/>
+            </a:schemeClr>
+          </a:lnRef>
+          <a:fillRef idx="1">
+            <a:schemeClr val="accent1"/>
+          </a:fillRef>
+          <a:effectRef idx="0">
+            <a:schemeClr val="accent1"/>
+          </a:effectRef>
+          <a:fontRef idx="minor">
+            <a:schemeClr val="lt1"/>
+          </a:fontRef>
+        </p:style>
+        <p:txBody>
+          <a:bodyPr rtlCol="0" anchor="ctr"/>
+          <a:lstStyle/>
+          <a:p>
+            <a:pPr algn="ctr"/>
+            <a:endParaRPr lang="de-DE"/>
+          </a:p>
+        </p:txBody>
+      </p:sp>
     </p:spTree>
     <p:extLst>
       <p:ext uri="{BB962C8B-B14F-4D97-AF65-F5344CB8AC3E}">
-        <p14:creationId xmlns:p14="http://schemas.microsoft.com/office/powerpoint/2010/main" val="2216576796"/>
+        <p14:creationId xmlns:p14="http://schemas.microsoft.com/office/powerpoint/2010/main" val="1779909796"/>
       </p:ext>
     </p:extLst>
   </p:cSld>

</xml_diff>